<commit_message>
Upload final versions of slides
</commit_message>
<xml_diff>
--- a/slides/2016-06-08-issues-1-3-reading.pptx
+++ b/slides/2016-06-08-issues-1-3-reading.pptx
@@ -5,7 +5,7 @@
     <p:sldMasterId id="2147483725" r:id="rId1"/>
   </p:sldMasterIdLst>
   <p:notesMasterIdLst>
-    <p:notesMasterId r:id="rId13"/>
+    <p:notesMasterId r:id="rId15"/>
   </p:notesMasterIdLst>
   <p:sldIdLst>
     <p:sldId id="256" r:id="rId2"/>
@@ -13,12 +13,14 @@
     <p:sldId id="282" r:id="rId4"/>
     <p:sldId id="259" r:id="rId5"/>
     <p:sldId id="260" r:id="rId6"/>
-    <p:sldId id="279" r:id="rId7"/>
-    <p:sldId id="283" r:id="rId8"/>
-    <p:sldId id="280" r:id="rId9"/>
-    <p:sldId id="276" r:id="rId10"/>
-    <p:sldId id="277" r:id="rId11"/>
-    <p:sldId id="278" r:id="rId12"/>
+    <p:sldId id="283" r:id="rId7"/>
+    <p:sldId id="280" r:id="rId8"/>
+    <p:sldId id="284" r:id="rId9"/>
+    <p:sldId id="285" r:id="rId10"/>
+    <p:sldId id="276" r:id="rId11"/>
+    <p:sldId id="279" r:id="rId12"/>
+    <p:sldId id="277" r:id="rId13"/>
+    <p:sldId id="278" r:id="rId14"/>
   </p:sldIdLst>
   <p:sldSz cx="12192000" cy="6858000"/>
   <p:notesSz cx="6858000" cy="9144000"/>
@@ -1330,7 +1332,7 @@
           <a:p>
             <a:fld id="{DE95333B-AF4E-2841-8178-C4418BDE481E}" type="datetimeFigureOut">
               <a:rPr lang="en-US" smtClean="0"/>
-              <a:t>6/7/16</a:t>
+              <a:t>6/8/16</a:t>
             </a:fld>
             <a:endParaRPr lang="en-US"/>
           </a:p>
@@ -1501,7 +1503,7 @@
           <a:p>
             <a:fld id="{DE95333B-AF4E-2841-8178-C4418BDE481E}" type="datetimeFigureOut">
               <a:rPr lang="en-US" smtClean="0"/>
-              <a:t>6/7/16</a:t>
+              <a:t>6/8/16</a:t>
             </a:fld>
             <a:endParaRPr lang="en-US"/>
           </a:p>
@@ -1691,7 +1693,7 @@
           <a:p>
             <a:fld id="{DE95333B-AF4E-2841-8178-C4418BDE481E}" type="datetimeFigureOut">
               <a:rPr lang="en-US" smtClean="0"/>
-              <a:t>6/7/16</a:t>
+              <a:t>6/8/16</a:t>
             </a:fld>
             <a:endParaRPr lang="en-US"/>
           </a:p>
@@ -2099,7 +2101,7 @@
           <a:p>
             <a:fld id="{DE95333B-AF4E-2841-8178-C4418BDE481E}" type="datetimeFigureOut">
               <a:rPr lang="en-US" smtClean="0"/>
-              <a:t>6/7/16</a:t>
+              <a:t>6/8/16</a:t>
             </a:fld>
             <a:endParaRPr lang="en-US"/>
           </a:p>
@@ -2355,7 +2357,7 @@
           <a:p>
             <a:fld id="{DE95333B-AF4E-2841-8178-C4418BDE481E}" type="datetimeFigureOut">
               <a:rPr lang="en-US" smtClean="0"/>
-              <a:t>6/7/16</a:t>
+              <a:t>6/8/16</a:t>
             </a:fld>
             <a:endParaRPr lang="en-US"/>
           </a:p>
@@ -2597,7 +2599,7 @@
           <a:p>
             <a:fld id="{DE95333B-AF4E-2841-8178-C4418BDE481E}" type="datetimeFigureOut">
               <a:rPr lang="en-US" smtClean="0"/>
-              <a:t>6/7/16</a:t>
+              <a:t>6/8/16</a:t>
             </a:fld>
             <a:endParaRPr lang="en-US"/>
           </a:p>
@@ -2979,7 +2981,7 @@
           <a:p>
             <a:fld id="{DE95333B-AF4E-2841-8178-C4418BDE481E}" type="datetimeFigureOut">
               <a:rPr lang="en-US" smtClean="0"/>
-              <a:t>6/7/16</a:t>
+              <a:t>6/8/16</a:t>
             </a:fld>
             <a:endParaRPr lang="en-US"/>
           </a:p>
@@ -3112,7 +3114,7 @@
           <a:p>
             <a:fld id="{DE95333B-AF4E-2841-8178-C4418BDE481E}" type="datetimeFigureOut">
               <a:rPr lang="en-US" smtClean="0"/>
-              <a:t>6/7/16</a:t>
+              <a:t>6/8/16</a:t>
             </a:fld>
             <a:endParaRPr lang="en-US"/>
           </a:p>
@@ -3208,7 +3210,7 @@
           <a:p>
             <a:fld id="{DE95333B-AF4E-2841-8178-C4418BDE481E}" type="datetimeFigureOut">
               <a:rPr lang="en-US" smtClean="0"/>
-              <a:t>6/7/16</a:t>
+              <a:t>6/8/16</a:t>
             </a:fld>
             <a:endParaRPr lang="en-US"/>
           </a:p>
@@ -3486,7 +3488,7 @@
           <a:p>
             <a:fld id="{DE95333B-AF4E-2841-8178-C4418BDE481E}" type="datetimeFigureOut">
               <a:rPr lang="en-US" smtClean="0"/>
-              <a:t>6/7/16</a:t>
+              <a:t>6/8/16</a:t>
             </a:fld>
             <a:endParaRPr lang="en-US"/>
           </a:p>
@@ -3758,7 +3760,7 @@
           <a:p>
             <a:fld id="{DE95333B-AF4E-2841-8178-C4418BDE481E}" type="datetimeFigureOut">
               <a:rPr lang="en-US" smtClean="0"/>
-              <a:t>6/7/16</a:t>
+              <a:t>6/8/16</a:t>
             </a:fld>
             <a:endParaRPr lang="en-US"/>
           </a:p>
@@ -3981,7 +3983,7 @@
           <a:p>
             <a:fld id="{DE95333B-AF4E-2841-8178-C4418BDE481E}" type="datetimeFigureOut">
               <a:rPr lang="en-US" smtClean="0"/>
-              <a:t>6/7/16</a:t>
+              <a:t>6/8/16</a:t>
             </a:fld>
             <a:endParaRPr lang="en-US"/>
           </a:p>
@@ -4542,6 +4544,221 @@
   <p:cSld>
     <p:spTree>
       <p:nvGrpSpPr>
+        <p:cNvPr id="1" name="Shape 197"/>
+        <p:cNvGrpSpPr/>
+        <p:nvPr/>
+      </p:nvGrpSpPr>
+      <p:grpSpPr>
+        <a:xfrm>
+          <a:off x="0" y="0"/>
+          <a:ext cx="0" cy="0"/>
+          <a:chOff x="0" y="0"/>
+          <a:chExt cx="0" cy="0"/>
+        </a:xfrm>
+      </p:grpSpPr>
+      <p:sp>
+        <p:nvSpPr>
+          <p:cNvPr id="198" name="Shape 198"/>
+          <p:cNvSpPr txBox="1">
+            <a:spLocks noGrp="1"/>
+          </p:cNvSpPr>
+          <p:nvPr>
+            <p:ph type="title"/>
+          </p:nvPr>
+        </p:nvSpPr>
+        <p:spPr>
+          <a:prstGeom prst="rect">
+            <a:avLst/>
+          </a:prstGeom>
+        </p:spPr>
+        <p:txBody>
+          <a:bodyPr vert="horz" lIns="91425" tIns="91425" rIns="91425" bIns="91425" rtlCol="0" anchor="b" anchorCtr="0">
+            <a:noAutofit/>
+          </a:bodyPr>
+          <a:lstStyle/>
+          <a:p>
+            <a:pPr>
+              <a:spcBef>
+                <a:spcPts val="0"/>
+              </a:spcBef>
+            </a:pPr>
+            <a:r>
+              <a:rPr lang="en"/>
+              <a:t>Backup Slides</a:t>
+            </a:r>
+          </a:p>
+        </p:txBody>
+      </p:sp>
+      <p:sp>
+        <p:nvSpPr>
+          <p:cNvPr id="2" name="Content Placeholder 1"/>
+          <p:cNvSpPr>
+            <a:spLocks noGrp="1"/>
+          </p:cNvSpPr>
+          <p:nvPr>
+            <p:ph idx="1"/>
+          </p:nvPr>
+        </p:nvSpPr>
+        <p:spPr/>
+        <p:txBody>
+          <a:bodyPr/>
+          <a:lstStyle/>
+          <a:p>
+            <a:endParaRPr lang="en-US"/>
+          </a:p>
+        </p:txBody>
+      </p:sp>
+    </p:spTree>
+  </p:cSld>
+  <p:clrMapOvr>
+    <a:masterClrMapping/>
+  </p:clrMapOvr>
+  <p:transition spd="slow">
+    <p:cut/>
+  </p:transition>
+  <p:timing>
+    <p:tnLst>
+      <p:par>
+        <p:cTn id="1" dur="indefinite" restart="never" nodeType="tmRoot"/>
+      </p:par>
+    </p:tnLst>
+  </p:timing>
+</p:sld>
+</file>
+
+<file path=ppt/slides/slide11.xml><?xml version="1.0" encoding="utf-8"?>
+<p:sld xmlns:a="http://schemas.openxmlformats.org/drawingml/2006/main" xmlns:r="http://schemas.openxmlformats.org/officeDocument/2006/relationships" xmlns:p="http://schemas.openxmlformats.org/presentationml/2006/main">
+  <p:cSld>
+    <p:spTree>
+      <p:nvGrpSpPr>
+        <p:cNvPr id="1" name=""/>
+        <p:cNvGrpSpPr/>
+        <p:nvPr/>
+      </p:nvGrpSpPr>
+      <p:grpSpPr>
+        <a:xfrm>
+          <a:off x="0" y="0"/>
+          <a:ext cx="0" cy="0"/>
+          <a:chOff x="0" y="0"/>
+          <a:chExt cx="0" cy="0"/>
+        </a:xfrm>
+      </p:grpSpPr>
+      <p:sp>
+        <p:nvSpPr>
+          <p:cNvPr id="2" name="Title 1"/>
+          <p:cNvSpPr>
+            <a:spLocks noGrp="1"/>
+          </p:cNvSpPr>
+          <p:nvPr>
+            <p:ph type="title"/>
+          </p:nvPr>
+        </p:nvSpPr>
+        <p:spPr/>
+        <p:txBody>
+          <a:bodyPr>
+            <a:normAutofit/>
+          </a:bodyPr>
+          <a:lstStyle/>
+          <a:p>
+            <a:r>
+              <a:rPr lang="en-US" dirty="0" smtClean="0"/>
+              <a:t>Objection from Bordeaux</a:t>
+            </a:r>
+            <a:endParaRPr lang="en-US" dirty="0"/>
+          </a:p>
+        </p:txBody>
+      </p:sp>
+      <p:sp>
+        <p:nvSpPr>
+          <p:cNvPr id="3" name="Text Placeholder 2"/>
+          <p:cNvSpPr>
+            <a:spLocks noGrp="1"/>
+          </p:cNvSpPr>
+          <p:nvPr>
+            <p:ph idx="1"/>
+          </p:nvPr>
+        </p:nvSpPr>
+        <p:spPr/>
+        <p:txBody>
+          <a:bodyPr/>
+          <a:lstStyle/>
+          <a:p>
+            <a:r>
+              <a:rPr lang="en-US" dirty="0" smtClean="0"/>
+              <a:t>Rolf pointed out a backward compatibility issue</a:t>
+            </a:r>
+          </a:p>
+          <a:p>
+            <a:pPr lvl="1"/>
+            <a:r>
+              <a:rPr lang="en-US" dirty="0" smtClean="0"/>
+              <a:t>An </a:t>
+            </a:r>
+            <a:r>
+              <a:rPr lang="en-US" dirty="0"/>
+              <a:t>application is catching its own errors via MPI_ERRORS_RETURN on MPI_COMM_WORLD, but does not change MPI_ERRORS_ARE_FATAL on MPI_COMM_SELF</a:t>
+            </a:r>
+            <a:r>
+              <a:rPr lang="en-US" dirty="0" smtClean="0"/>
+              <a:t>.</a:t>
+            </a:r>
+          </a:p>
+          <a:p>
+            <a:pPr lvl="1"/>
+            <a:r>
+              <a:rPr lang="en-US" dirty="0" smtClean="0"/>
+              <a:t>A simple error (MPI_ALLOC_MEM) would abort in this model where it did not before.</a:t>
+            </a:r>
+          </a:p>
+          <a:p>
+            <a:r>
+              <a:rPr lang="en-US" dirty="0" smtClean="0"/>
+              <a:t>The forum considered this problem and straw voted to break backward compatibility here.</a:t>
+            </a:r>
+          </a:p>
+          <a:p>
+            <a:pPr lvl="1"/>
+            <a:r>
+              <a:rPr lang="en-US" dirty="0" smtClean="0"/>
+              <a:t>We looked at it in the working group and came up with alternatives, but all required adding a bunch of new semantics. (Discussion on issue)</a:t>
+            </a:r>
+            <a:endParaRPr lang="en-US" dirty="0"/>
+          </a:p>
+        </p:txBody>
+      </p:sp>
+    </p:spTree>
+    <p:extLst>
+      <p:ext uri="{BB962C8B-B14F-4D97-AF65-F5344CB8AC3E}">
+        <p14:creationId xmlns:p14="http://schemas.microsoft.com/office/powerpoint/2010/main" val="1519851262"/>
+      </p:ext>
+    </p:extLst>
+  </p:cSld>
+  <p:clrMapOvr>
+    <a:masterClrMapping/>
+  </p:clrMapOvr>
+  <mc:AlternateContent xmlns:mc="http://schemas.openxmlformats.org/markup-compatibility/2006">
+    <mc:Choice xmlns:p14="http://schemas.microsoft.com/office/powerpoint/2010/main" Requires="p14">
+      <p:transition spd="slow" p14:dur="2000"/>
+    </mc:Choice>
+    <mc:Fallback>
+      <p:transition spd="slow"/>
+    </mc:Fallback>
+  </mc:AlternateContent>
+  <p:timing>
+    <p:tnLst>
+      <p:par>
+        <p:cTn id="1" dur="indefinite" restart="never" nodeType="tmRoot"/>
+      </p:par>
+    </p:tnLst>
+  </p:timing>
+</p:sld>
+</file>
+
+<file path=ppt/slides/slide12.xml><?xml version="1.0" encoding="utf-8"?>
+<p:sld xmlns:a="http://schemas.openxmlformats.org/drawingml/2006/main" xmlns:r="http://schemas.openxmlformats.org/officeDocument/2006/relationships" xmlns:p="http://schemas.openxmlformats.org/presentationml/2006/main">
+  <p:cSld>
+    <p:spTree>
+      <p:nvGrpSpPr>
         <p:cNvPr id="1" name="Shape 203"/>
         <p:cNvGrpSpPr/>
         <p:nvPr/>
@@ -4732,7 +4949,7 @@
 </p:sld>
 </file>
 
-<file path=ppt/slides/slide11.xml><?xml version="1.0" encoding="utf-8"?>
+<file path=ppt/slides/slide13.xml><?xml version="1.0" encoding="utf-8"?>
 <p:sld xmlns:a="http://schemas.openxmlformats.org/drawingml/2006/main" xmlns:r="http://schemas.openxmlformats.org/officeDocument/2006/relationships" xmlns:p="http://schemas.openxmlformats.org/presentationml/2006/main">
   <p:cSld>
     <p:spTree>
@@ -5204,6 +5421,13 @@
   <p:clrMapOvr>
     <a:masterClrMapping/>
   </p:clrMapOvr>
+  <p:timing>
+    <p:tnLst>
+      <p:par>
+        <p:cTn id="1" dur="indefinite" restart="never" nodeType="tmRoot"/>
+      </p:par>
+    </p:tnLst>
+  </p:timing>
 </p:sld>
 </file>
 
@@ -5361,6 +5585,13 @@
   <p:clrMapOvr>
     <a:masterClrMapping/>
   </p:clrMapOvr>
+  <p:timing>
+    <p:tnLst>
+      <p:par>
+        <p:cTn id="1" dur="indefinite" restart="never" nodeType="tmRoot"/>
+      </p:par>
+    </p:tnLst>
+  </p:timing>
 </p:sld>
 </file>
 
@@ -5609,7 +5840,7 @@
 </file>
 
 <file path=ppt/slides/slide6.xml><?xml version="1.0" encoding="utf-8"?>
-<p:sld xmlns:a="http://schemas.openxmlformats.org/drawingml/2006/main" xmlns:r="http://schemas.openxmlformats.org/officeDocument/2006/relationships" xmlns:p="http://schemas.openxmlformats.org/presentationml/2006/main" show="0">
+<p:sld xmlns:a="http://schemas.openxmlformats.org/drawingml/2006/main" xmlns:r="http://schemas.openxmlformats.org/officeDocument/2006/relationships" xmlns:p="http://schemas.openxmlformats.org/presentationml/2006/main">
   <p:cSld>
     <p:spTree>
       <p:nvGrpSpPr>
@@ -5637,14 +5868,12 @@
         </p:nvSpPr>
         <p:spPr/>
         <p:txBody>
-          <a:bodyPr>
-            <a:normAutofit/>
-          </a:bodyPr>
-          <a:lstStyle/>
-          <a:p>
-            <a:r>
-              <a:rPr lang="en-US" dirty="0" smtClean="0"/>
-              <a:t>Objection from Bordeaux</a:t>
+          <a:bodyPr/>
+          <a:lstStyle/>
+          <a:p>
+            <a:r>
+              <a:rPr lang="en" dirty="0"/>
+              <a:t>Burden on Implementations</a:t>
             </a:r>
             <a:endParaRPr lang="en-US" dirty="0"/>
           </a:p>
@@ -5652,7 +5881,7 @@
       </p:sp>
       <p:sp>
         <p:nvSpPr>
-          <p:cNvPr id="3" name="Text Placeholder 2"/>
+          <p:cNvPr id="3" name="Content Placeholder 2"/>
           <p:cNvSpPr>
             <a:spLocks noGrp="1"/>
           </p:cNvSpPr>
@@ -5666,66 +5895,88 @@
           <a:lstStyle/>
           <a:p>
             <a:r>
-              <a:rPr lang="en-US" dirty="0" smtClean="0"/>
-              <a:t>Rolf pointed out a backward compatibility issue</a:t>
+              <a:rPr lang="en" dirty="0"/>
+              <a:t>Must provide MPI_ERRORS_ABORT</a:t>
             </a:r>
           </a:p>
           <a:p>
             <a:pPr lvl="1"/>
             <a:r>
-              <a:rPr lang="en-US" dirty="0" smtClean="0"/>
-              <a:t>An </a:t>
-            </a:r>
-            <a:r>
-              <a:rPr lang="en-US" dirty="0"/>
-              <a:t>application is catching its own errors via MPI_ERRORS_RETURN on MPI_COMM_WORLD, but does not change MPI_ERRORS_ARE_FATAL on MPI_COMM_SELF</a:t>
-            </a:r>
-            <a:r>
-              <a:rPr lang="en-US" dirty="0" smtClean="0"/>
-              <a:t>.</a:t>
+              <a:rPr lang="en" dirty="0"/>
+              <a:t>In practice, could be the same as </a:t>
+            </a:r>
+            <a:r>
+              <a:rPr lang="en" dirty="0" smtClean="0"/>
+              <a:t>MPI_ERRORS_ARE_FATAL</a:t>
+            </a:r>
+            <a:endParaRPr lang="en-US" dirty="0"/>
+          </a:p>
+          <a:p>
+            <a:r>
+              <a:rPr lang="en" dirty="0"/>
+              <a:t>Change error handler propagation for windows</a:t>
             </a:r>
           </a:p>
           <a:p>
             <a:pPr lvl="1"/>
             <a:r>
-              <a:rPr lang="en-US" dirty="0" smtClean="0"/>
-              <a:t>A simple error (MPI_ALLOC_MEM) would abort in this model where it did not before.</a:t>
-            </a:r>
-          </a:p>
-          <a:p>
-            <a:r>
-              <a:rPr lang="en-US" dirty="0" smtClean="0"/>
-              <a:t>The forum considered this problem and straw voted to break backward compatibility here.</a:t>
-            </a:r>
+              <a:rPr lang="en" dirty="0"/>
+              <a:t>Minor change to inherit from MPI_WIN_NULL</a:t>
+            </a:r>
+          </a:p>
+          <a:p>
+            <a:r>
+              <a:rPr lang="en" dirty="0"/>
+              <a:t>Can still abort all processes if that’s what the implementation wants to </a:t>
+            </a:r>
+            <a:r>
+              <a:rPr lang="en" dirty="0" smtClean="0"/>
+              <a:t>do</a:t>
+            </a:r>
+            <a:endParaRPr lang="en-US" dirty="0" smtClean="0"/>
           </a:p>
           <a:p>
             <a:pPr lvl="1"/>
             <a:r>
-              <a:rPr lang="en-US" dirty="0" smtClean="0"/>
-              <a:t>We looked at it in the working group and came up with alternatives, but all required adding a bunch of new semantics. (Discussion on issue)</a:t>
-            </a:r>
-            <a:endParaRPr lang="en-US" dirty="0"/>
+              <a:rPr lang="en" dirty="0"/>
+              <a:t>Implementations that choose to do better now have clear </a:t>
+            </a:r>
+            <a:r>
+              <a:rPr lang="en" dirty="0" smtClean="0"/>
+              <a:t>instructions</a:t>
+            </a:r>
+            <a:endParaRPr lang="en-US" dirty="0" smtClean="0"/>
+          </a:p>
+          <a:p>
+            <a:r>
+              <a:rPr lang="en" dirty="0"/>
+              <a:t>Optional:</a:t>
+            </a:r>
+          </a:p>
+          <a:p>
+            <a:pPr lvl="1"/>
+            <a:r>
+              <a:rPr lang="en" dirty="0"/>
+              <a:t>Improve MPI_ABORT to only abort a </a:t>
+            </a:r>
+            <a:r>
+              <a:rPr lang="en" dirty="0" err="1" smtClean="0"/>
+              <a:t>subcommunicator</a:t>
+            </a:r>
+            <a:endParaRPr lang="en" dirty="0"/>
           </a:p>
         </p:txBody>
       </p:sp>
     </p:spTree>
     <p:extLst>
       <p:ext uri="{BB962C8B-B14F-4D97-AF65-F5344CB8AC3E}">
-        <p14:creationId xmlns:p14="http://schemas.microsoft.com/office/powerpoint/2010/main" val="1519851262"/>
+        <p14:creationId xmlns:p14="http://schemas.microsoft.com/office/powerpoint/2010/main" val="1715827594"/>
       </p:ext>
     </p:extLst>
   </p:cSld>
   <p:clrMapOvr>
     <a:masterClrMapping/>
   </p:clrMapOvr>
-  <mc:AlternateContent xmlns:mc="http://schemas.openxmlformats.org/markup-compatibility/2006">
-    <mc:Choice xmlns:p14="http://schemas.microsoft.com/office/powerpoint/2010/main" Requires="p14">
-      <p:transition spd="slow" p14:dur="2000"/>
-    </mc:Choice>
-    <mc:Fallback>
-      <p:transition spd="slow"/>
-    </mc:Fallback>
-  </mc:AlternateContent>
   <p:timing>
     <p:tnLst>
       <p:par>
@@ -5765,115 +6016,67 @@
         </p:nvSpPr>
         <p:spPr/>
         <p:txBody>
+          <a:bodyPr>
+            <a:normAutofit/>
+          </a:bodyPr>
+          <a:lstStyle/>
+          <a:p>
+            <a:r>
+              <a:rPr lang="en-US" dirty="0" smtClean="0"/>
+              <a:t>Read Through Changes</a:t>
+            </a:r>
+            <a:endParaRPr lang="en-US" dirty="0"/>
+          </a:p>
+        </p:txBody>
+      </p:sp>
+      <p:sp>
+        <p:nvSpPr>
+          <p:cNvPr id="3" name="Text Placeholder 2"/>
+          <p:cNvSpPr>
+            <a:spLocks noGrp="1"/>
+          </p:cNvSpPr>
+          <p:nvPr>
+            <p:ph idx="1"/>
+          </p:nvPr>
+        </p:nvSpPr>
+        <p:spPr/>
+        <p:txBody>
           <a:bodyPr/>
           <a:lstStyle/>
           <a:p>
             <a:r>
-              <a:rPr lang="en" dirty="0"/>
-              <a:t>Burden on Implementations</a:t>
-            </a:r>
-            <a:endParaRPr lang="en-US" dirty="0"/>
-          </a:p>
-        </p:txBody>
-      </p:sp>
-      <p:sp>
-        <p:nvSpPr>
-          <p:cNvPr id="3" name="Content Placeholder 2"/>
-          <p:cNvSpPr>
-            <a:spLocks noGrp="1"/>
-          </p:cNvSpPr>
-          <p:nvPr>
-            <p:ph idx="1"/>
-          </p:nvPr>
-        </p:nvSpPr>
-        <p:spPr/>
-        <p:txBody>
-          <a:bodyPr/>
-          <a:lstStyle/>
-          <a:p>
-            <a:r>
-              <a:rPr lang="en" dirty="0"/>
-              <a:t>Must provide MPI_ERRORS_ABORT</a:t>
-            </a:r>
-          </a:p>
-          <a:p>
-            <a:pPr lvl="1"/>
-            <a:r>
-              <a:rPr lang="en" dirty="0"/>
-              <a:t>In practice, could be the same as </a:t>
-            </a:r>
-            <a:r>
-              <a:rPr lang="en" dirty="0" smtClean="0"/>
-              <a:t>MPI_ERRORS_ARE_FATAL</a:t>
-            </a:r>
-            <a:endParaRPr lang="en-US" dirty="0"/>
-          </a:p>
-          <a:p>
-            <a:r>
-              <a:rPr lang="en" dirty="0"/>
-              <a:t>Change error handler propagation for windows</a:t>
-            </a:r>
-          </a:p>
-          <a:p>
-            <a:pPr lvl="1"/>
-            <a:r>
-              <a:rPr lang="en" dirty="0"/>
-              <a:t>Minor change to inherit from MPI_WIN_NULL</a:t>
-            </a:r>
-          </a:p>
-          <a:p>
-            <a:r>
-              <a:rPr lang="en" dirty="0"/>
-              <a:t>Can still abort all processes if that’s what the implementation wants to </a:t>
-            </a:r>
-            <a:r>
-              <a:rPr lang="en" dirty="0" smtClean="0"/>
-              <a:t>do</a:t>
+              <a:rPr lang="en-US" dirty="0">
+                <a:hlinkClick r:id="rId2"/>
+              </a:rPr>
+              <a:t>https://</a:t>
+            </a:r>
+            <a:r>
+              <a:rPr lang="en-US" dirty="0" smtClean="0">
+                <a:hlinkClick r:id="rId2"/>
+              </a:rPr>
+              <a:t>github.com/mpi-forum/mpi-standard/pull/1</a:t>
             </a:r>
             <a:endParaRPr lang="en-US" dirty="0" smtClean="0"/>
-          </a:p>
-          <a:p>
-            <a:pPr lvl="1"/>
-            <a:r>
-              <a:rPr lang="en" dirty="0"/>
-              <a:t>Implementations that choose to do better now have clear </a:t>
-            </a:r>
-            <a:r>
-              <a:rPr lang="en" dirty="0" smtClean="0"/>
-              <a:t>instructions</a:t>
-            </a:r>
-            <a:endParaRPr lang="en-US" dirty="0" smtClean="0"/>
-          </a:p>
-          <a:p>
-            <a:r>
-              <a:rPr lang="en" dirty="0"/>
-              <a:t>Optional:</a:t>
-            </a:r>
-          </a:p>
-          <a:p>
-            <a:pPr lvl="1"/>
-            <a:r>
-              <a:rPr lang="en" dirty="0"/>
-              <a:t>Improve MPI_ABORT to only abort a </a:t>
-            </a:r>
-            <a:r>
-              <a:rPr lang="en" dirty="0" err="1" smtClean="0"/>
-              <a:t>subcommunicator</a:t>
-            </a:r>
-            <a:endParaRPr lang="en" dirty="0"/>
           </a:p>
         </p:txBody>
       </p:sp>
     </p:spTree>
     <p:extLst>
       <p:ext uri="{BB962C8B-B14F-4D97-AF65-F5344CB8AC3E}">
-        <p14:creationId xmlns:p14="http://schemas.microsoft.com/office/powerpoint/2010/main" val="1715827594"/>
+        <p14:creationId xmlns:p14="http://schemas.microsoft.com/office/powerpoint/2010/main" val="1587656490"/>
       </p:ext>
     </p:extLst>
   </p:cSld>
   <p:clrMapOvr>
     <a:masterClrMapping/>
   </p:clrMapOvr>
+  <p:timing>
+    <p:tnLst>
+      <p:par>
+        <p:cTn id="1" dur="indefinite" restart="never" nodeType="tmRoot"/>
+      </p:par>
+    </p:tnLst>
+  </p:timing>
 </p:sld>
 </file>
 
@@ -5906,54 +6109,119 @@
         </p:nvSpPr>
         <p:spPr/>
         <p:txBody>
+          <a:bodyPr/>
+          <a:lstStyle/>
+          <a:p>
+            <a:r>
+              <a:rPr lang="en-US" dirty="0" smtClean="0"/>
+              <a:t>Straw Vote #1</a:t>
+            </a:r>
+            <a:br>
+              <a:rPr lang="en-US" dirty="0" smtClean="0"/>
+            </a:br>
+            <a:r>
+              <a:rPr lang="en-US" dirty="0" smtClean="0"/>
+              <a:t>How are error handlers inherited?</a:t>
+            </a:r>
+            <a:endParaRPr lang="en-US" dirty="0"/>
+          </a:p>
+        </p:txBody>
+      </p:sp>
+      <p:sp>
+        <p:nvSpPr>
+          <p:cNvPr id="3" name="Content Placeholder 2"/>
+          <p:cNvSpPr>
+            <a:spLocks noGrp="1"/>
+          </p:cNvSpPr>
+          <p:nvPr>
+            <p:ph idx="1"/>
+          </p:nvPr>
+        </p:nvSpPr>
+        <p:spPr/>
+        <p:txBody>
           <a:bodyPr>
-            <a:normAutofit/>
+            <a:normAutofit fontScale="92500" lnSpcReduction="10000"/>
           </a:bodyPr>
           <a:lstStyle/>
           <a:p>
+            <a:pPr marL="514350" indent="-514350">
+              <a:buFont typeface="+mj-lt"/>
+              <a:buAutoNum type="arabicPeriod"/>
+            </a:pPr>
             <a:r>
               <a:rPr lang="en-US" dirty="0" smtClean="0"/>
-              <a:t>Read Through Changes</a:t>
+              <a:t>No communicator inheritance except for DUP. </a:t>
+            </a:r>
+            <a:r>
+              <a:rPr lang="en-US" dirty="0" err="1" smtClean="0"/>
+              <a:t>Intercomm_create</a:t>
+            </a:r>
+            <a:r>
+              <a:rPr lang="en-US" dirty="0" smtClean="0"/>
+              <a:t> changes to not inherit. Everything gets MPI_ERRORS_ARE_FATAL.</a:t>
+            </a:r>
+          </a:p>
+          <a:p>
+            <a:pPr marL="514350" indent="-514350">
+              <a:buFont typeface="+mj-lt"/>
+              <a:buAutoNum type="arabicPeriod"/>
+            </a:pPr>
+            <a:endParaRPr lang="en-US" dirty="0" smtClean="0"/>
+          </a:p>
+          <a:p>
+            <a:pPr marL="514350" indent="-514350">
+              <a:buFont typeface="+mj-lt"/>
+              <a:buAutoNum type="arabicPeriod"/>
+            </a:pPr>
+            <a:r>
+              <a:rPr lang="en-US" dirty="0" smtClean="0"/>
+              <a:t>All objects inherit from MPI_XXX_NULL (no exceptions).</a:t>
+            </a:r>
+          </a:p>
+          <a:p>
+            <a:pPr marL="514350" indent="-514350">
+              <a:buFont typeface="+mj-lt"/>
+              <a:buAutoNum type="arabicPeriod"/>
+            </a:pPr>
+            <a:endParaRPr lang="en-US" dirty="0" smtClean="0"/>
+          </a:p>
+          <a:p>
+            <a:pPr marL="514350" indent="-514350">
+              <a:buFont typeface="+mj-lt"/>
+              <a:buAutoNum type="arabicPeriod"/>
+            </a:pPr>
+            <a:r>
+              <a:rPr lang="en-US" dirty="0" smtClean="0"/>
+              <a:t>Existing proposal. Communicators inherit from each other. Windows and Files inherit from MPI_XXX_NULL.</a:t>
+            </a:r>
+          </a:p>
+          <a:p>
+            <a:pPr marL="514350" indent="-514350">
+              <a:buFont typeface="+mj-lt"/>
+              <a:buAutoNum type="arabicPeriod"/>
+            </a:pPr>
+            <a:endParaRPr lang="en-US" dirty="0" smtClean="0"/>
+          </a:p>
+          <a:p>
+            <a:pPr marL="0" indent="0">
+              <a:buNone/>
+            </a:pPr>
+            <a:r>
+              <a:rPr lang="en-US" dirty="0" smtClean="0"/>
+              <a:t>Ryan suggestion: Don’t use MPI_XXX_NULL. Instead use </a:t>
+            </a:r>
+            <a:r>
+              <a:rPr lang="en-US" dirty="0" err="1" smtClean="0"/>
+              <a:t>MPI_XXX_something_else</a:t>
             </a:r>
             <a:endParaRPr lang="en-US" dirty="0"/>
-          </a:p>
-        </p:txBody>
-      </p:sp>
-      <p:sp>
-        <p:nvSpPr>
-          <p:cNvPr id="3" name="Text Placeholder 2"/>
-          <p:cNvSpPr>
-            <a:spLocks noGrp="1"/>
-          </p:cNvSpPr>
-          <p:nvPr>
-            <p:ph idx="1"/>
-          </p:nvPr>
-        </p:nvSpPr>
-        <p:spPr/>
-        <p:txBody>
-          <a:bodyPr/>
-          <a:lstStyle/>
-          <a:p>
-            <a:r>
-              <a:rPr lang="en-US" dirty="0">
-                <a:hlinkClick r:id="rId2"/>
-              </a:rPr>
-              <a:t>https://</a:t>
-            </a:r>
-            <a:r>
-              <a:rPr lang="en-US" dirty="0" smtClean="0">
-                <a:hlinkClick r:id="rId2"/>
-              </a:rPr>
-              <a:t>github.com/mpi-forum/mpi-standard/pull/1</a:t>
-            </a:r>
-            <a:endParaRPr lang="en-US" dirty="0" smtClean="0"/>
           </a:p>
         </p:txBody>
       </p:sp>
     </p:spTree>
     <p:extLst>
       <p:ext uri="{BB962C8B-B14F-4D97-AF65-F5344CB8AC3E}">
-        <p14:creationId xmlns:p14="http://schemas.microsoft.com/office/powerpoint/2010/main" val="1587656490"/>
+        <p14:creationId xmlns:p14="http://schemas.microsoft.com/office/powerpoint/2010/main" val="775889202"/>
       </p:ext>
     </p:extLst>
   </p:cSld>
@@ -5975,7 +6243,7 @@
   <p:cSld>
     <p:spTree>
       <p:nvGrpSpPr>
-        <p:cNvPr id="1" name="Shape 197"/>
+        <p:cNvPr id="1" name=""/>
         <p:cNvGrpSpPr/>
         <p:nvPr/>
       </p:nvGrpSpPr>
@@ -5989,64 +6257,102 @@
       </p:grpSpPr>
       <p:sp>
         <p:nvSpPr>
-          <p:cNvPr id="198" name="Shape 198"/>
-          <p:cNvSpPr txBox="1">
+          <p:cNvPr id="2" name="Title 1"/>
+          <p:cNvSpPr>
             <a:spLocks noGrp="1"/>
           </p:cNvSpPr>
           <p:nvPr>
             <p:ph type="title"/>
           </p:nvPr>
         </p:nvSpPr>
+        <p:spPr/>
+        <p:txBody>
+          <a:bodyPr>
+            <a:normAutofit fontScale="90000"/>
+          </a:bodyPr>
+          <a:lstStyle/>
+          <a:p>
+            <a:r>
+              <a:rPr lang="en-US" dirty="0" smtClean="0"/>
+              <a:t>Straw Vote #2</a:t>
+            </a:r>
+            <a:br>
+              <a:rPr lang="en-US" dirty="0" smtClean="0"/>
+            </a:br>
+            <a:r>
+              <a:rPr lang="en-US" dirty="0" smtClean="0"/>
+              <a:t>Are you comfortable with the reading as is (mod minor text changes mentioned)?</a:t>
+            </a:r>
+            <a:endParaRPr lang="en-US" dirty="0"/>
+          </a:p>
+        </p:txBody>
+      </p:sp>
+      <p:sp>
+        <p:nvSpPr>
+          <p:cNvPr id="3" name="Content Placeholder 2"/>
+          <p:cNvSpPr>
+            <a:spLocks noGrp="1"/>
+          </p:cNvSpPr>
+          <p:nvPr>
+            <p:ph idx="1"/>
+          </p:nvPr>
+        </p:nvSpPr>
         <p:spPr>
-          <a:prstGeom prst="rect">
-            <a:avLst/>
-          </a:prstGeom>
+          <a:xfrm>
+            <a:off x="838200" y="2506662"/>
+            <a:ext cx="10515600" cy="4351338"/>
+          </a:xfrm>
         </p:spPr>
         <p:txBody>
-          <a:bodyPr vert="horz" lIns="91425" tIns="91425" rIns="91425" bIns="91425" rtlCol="0" anchor="b" anchorCtr="0">
-            <a:noAutofit/>
-          </a:bodyPr>
-          <a:lstStyle/>
-          <a:p>
-            <a:pPr>
-              <a:spcBef>
-                <a:spcPts val="0"/>
-              </a:spcBef>
+          <a:bodyPr/>
+          <a:lstStyle/>
+          <a:p>
+            <a:pPr marL="514350" indent="-514350">
+              <a:buFont typeface="+mj-lt"/>
+              <a:buAutoNum type="arabicPeriod"/>
             </a:pPr>
             <a:r>
-              <a:rPr lang="en"/>
-              <a:t>Backup Slides</a:t>
-            </a:r>
-          </a:p>
-        </p:txBody>
-      </p:sp>
-      <p:sp>
-        <p:nvSpPr>
-          <p:cNvPr id="2" name="Content Placeholder 1"/>
-          <p:cNvSpPr>
-            <a:spLocks noGrp="1"/>
-          </p:cNvSpPr>
-          <p:nvPr>
-            <p:ph idx="1"/>
-          </p:nvPr>
-        </p:nvSpPr>
-        <p:spPr/>
-        <p:txBody>
-          <a:bodyPr/>
-          <a:lstStyle/>
-          <a:p>
-            <a:endParaRPr lang="en-US"/>
+              <a:rPr lang="en-US" dirty="0" smtClean="0"/>
+              <a:t>Yes</a:t>
+            </a:r>
+          </a:p>
+          <a:p>
+            <a:pPr marL="514350" indent="-514350">
+              <a:buFont typeface="+mj-lt"/>
+              <a:buAutoNum type="arabicPeriod"/>
+            </a:pPr>
+            <a:endParaRPr lang="en-US" dirty="0" smtClean="0"/>
+          </a:p>
+          <a:p>
+            <a:pPr marL="514350" indent="-514350">
+              <a:buFont typeface="+mj-lt"/>
+              <a:buAutoNum type="arabicPeriod"/>
+            </a:pPr>
+            <a:r>
+              <a:rPr lang="en-US" dirty="0" smtClean="0"/>
+              <a:t>No</a:t>
+            </a:r>
+            <a:endParaRPr lang="en-US" dirty="0"/>
           </a:p>
         </p:txBody>
       </p:sp>
     </p:spTree>
+    <p:extLst>
+      <p:ext uri="{BB962C8B-B14F-4D97-AF65-F5344CB8AC3E}">
+        <p14:creationId xmlns:p14="http://schemas.microsoft.com/office/powerpoint/2010/main" val="157756555"/>
+      </p:ext>
+    </p:extLst>
   </p:cSld>
   <p:clrMapOvr>
     <a:masterClrMapping/>
   </p:clrMapOvr>
-  <p:transition spd="slow">
-    <p:cut/>
-  </p:transition>
+  <p:timing>
+    <p:tnLst>
+      <p:par>
+        <p:cTn id="1" dur="indefinite" restart="never" nodeType="tmRoot"/>
+      </p:par>
+    </p:tnLst>
+  </p:timing>
 </p:sld>
 </file>
 

</xml_diff>